<commit_message>
Modified pptx-all MFA plots
</commit_message>
<xml_diff>
--- a/presentation/dds_autumn_school_2025_paw_presentation_14-11-2025.pptx
+++ b/presentation/dds_autumn_school_2025_paw_presentation_14-11-2025.pptx
@@ -5,7 +5,7 @@
     <p:sldMasterId id="2147483648" r:id="rId1"/>
   </p:sldMasterIdLst>
   <p:notesMasterIdLst>
-    <p:notesMasterId r:id="rId17"/>
+    <p:notesMasterId r:id="rId18"/>
   </p:notesMasterIdLst>
   <p:sldIdLst>
     <p:sldId id="256" r:id="rId2"/>
@@ -18,11 +18,12 @@
     <p:sldId id="269" r:id="rId9"/>
     <p:sldId id="272" r:id="rId10"/>
     <p:sldId id="262" r:id="rId11"/>
-    <p:sldId id="257" r:id="rId12"/>
-    <p:sldId id="258" r:id="rId13"/>
-    <p:sldId id="259" r:id="rId14"/>
-    <p:sldId id="260" r:id="rId15"/>
-    <p:sldId id="261" r:id="rId16"/>
+    <p:sldId id="275" r:id="rId12"/>
+    <p:sldId id="257" r:id="rId13"/>
+    <p:sldId id="258" r:id="rId14"/>
+    <p:sldId id="259" r:id="rId15"/>
+    <p:sldId id="260" r:id="rId16"/>
+    <p:sldId id="261" r:id="rId17"/>
   </p:sldIdLst>
   <p:sldSz cx="12192000" cy="6858000"/>
   <p:notesSz cx="6858000" cy="9144000"/>
@@ -4492,6 +4493,69 @@
           </a:prstGeom>
         </p:spPr>
       </p:pic>
+      <p:sp>
+        <p:nvSpPr>
+          <p:cNvPr id="4" name="TextBox 3">
+            <a:extLst>
+              <a:ext uri="{FF2B5EF4-FFF2-40B4-BE49-F238E27FC236}">
+                <a16:creationId xmlns:a16="http://schemas.microsoft.com/office/drawing/2014/main" id="{E6201F68-253E-7A24-AE10-2AF501F44104}"/>
+              </a:ext>
+            </a:extLst>
+          </p:cNvPr>
+          <p:cNvSpPr txBox="1"/>
+          <p:nvPr/>
+        </p:nvSpPr>
+        <p:spPr>
+          <a:xfrm>
+            <a:off x="265386" y="964742"/>
+            <a:ext cx="7519713" cy="830997"/>
+          </a:xfrm>
+          <a:prstGeom prst="rect">
+            <a:avLst/>
+          </a:prstGeom>
+          <a:noFill/>
+        </p:spPr>
+        <p:txBody>
+          <a:bodyPr wrap="square">
+            <a:spAutoFit/>
+          </a:bodyPr>
+          <a:lstStyle/>
+          <a:p>
+            <a:r>
+              <a:rPr lang="en-US" sz="2400" dirty="0">
+                <a:solidFill>
+                  <a:schemeClr val="bg2">
+                    <a:lumMod val="25000"/>
+                  </a:schemeClr>
+                </a:solidFill>
+                <a:latin typeface="Arial Rounded MT Bold" panose="020F0704030504030204" pitchFamily="34" charset="77"/>
+              </a:rPr>
+              <a:t>Total </a:t>
+            </a:r>
+          </a:p>
+          <a:p>
+            <a:r>
+              <a:rPr lang="en-US" sz="2400" dirty="0">
+                <a:solidFill>
+                  <a:schemeClr val="bg2">
+                    <a:lumMod val="25000"/>
+                  </a:schemeClr>
+                </a:solidFill>
+                <a:latin typeface="Arial Rounded MT Bold" panose="020F0704030504030204" pitchFamily="34" charset="77"/>
+              </a:rPr>
+              <a:t>Material Flow, summed over the dimensions </a:t>
+            </a:r>
+            <a:endParaRPr lang="en-US" sz="2400" noProof="0" dirty="0">
+              <a:solidFill>
+                <a:schemeClr val="bg2">
+                  <a:lumMod val="25000"/>
+                </a:schemeClr>
+              </a:solidFill>
+              <a:latin typeface="Arial Rounded MT Bold" panose="020F0704030504030204" pitchFamily="34" charset="77"/>
+            </a:endParaRPr>
+          </a:p>
+        </p:txBody>
+      </p:sp>
     </p:spTree>
     <p:extLst>
       <p:ext uri="{BB962C8B-B14F-4D97-AF65-F5344CB8AC3E}">
@@ -4511,6 +4575,72 @@
 </file>
 
 <file path=ppt/slides/slide11.xml><?xml version="1.0" encoding="utf-8"?>
+<p:sld xmlns:a="http://schemas.openxmlformats.org/drawingml/2006/main" xmlns:r="http://schemas.openxmlformats.org/officeDocument/2006/relationships" xmlns:p="http://schemas.openxmlformats.org/presentationml/2006/main">
+  <p:cSld>
+    <p:spTree>
+      <p:nvGrpSpPr>
+        <p:cNvPr id="1" name="">
+          <a:extLst>
+            <a:ext uri="{FF2B5EF4-FFF2-40B4-BE49-F238E27FC236}">
+              <a16:creationId xmlns:a16="http://schemas.microsoft.com/office/drawing/2014/main" id="{76B1E429-85BA-1BB1-1449-6DF8238DD9AB}"/>
+            </a:ext>
+          </a:extLst>
+        </p:cNvPr>
+        <p:cNvGrpSpPr/>
+        <p:nvPr/>
+      </p:nvGrpSpPr>
+      <p:grpSpPr>
+        <a:xfrm>
+          <a:off x="0" y="0"/>
+          <a:ext cx="0" cy="0"/>
+          <a:chOff x="0" y="0"/>
+          <a:chExt cx="0" cy="0"/>
+        </a:xfrm>
+      </p:grpSpPr>
+      <p:pic>
+        <p:nvPicPr>
+          <p:cNvPr id="3" name="Picture 2" descr="A diagram of different colored lines&#10;&#10;AI-generated content may be incorrect.">
+            <a:extLst>
+              <a:ext uri="{FF2B5EF4-FFF2-40B4-BE49-F238E27FC236}">
+                <a16:creationId xmlns:a16="http://schemas.microsoft.com/office/drawing/2014/main" id="{BBC5FB50-4B7C-8ED6-9C0A-AFBE4099C4AB}"/>
+              </a:ext>
+            </a:extLst>
+          </p:cNvPr>
+          <p:cNvPicPr>
+            <a:picLocks noChangeAspect="1"/>
+          </p:cNvPicPr>
+          <p:nvPr/>
+        </p:nvPicPr>
+        <p:blipFill>
+          <a:blip r:embed="rId2"/>
+          <a:stretch>
+            <a:fillRect/>
+          </a:stretch>
+        </p:blipFill>
+        <p:spPr>
+          <a:xfrm>
+            <a:off x="0" y="1708046"/>
+            <a:ext cx="12192000" cy="3441907"/>
+          </a:xfrm>
+          <a:prstGeom prst="rect">
+            <a:avLst/>
+          </a:prstGeom>
+        </p:spPr>
+      </p:pic>
+    </p:spTree>
+    <p:extLst>
+      <p:ext uri="{BB962C8B-B14F-4D97-AF65-F5344CB8AC3E}">
+        <p14:creationId xmlns:p14="http://schemas.microsoft.com/office/powerpoint/2010/main" val="364705490"/>
+      </p:ext>
+    </p:extLst>
+  </p:cSld>
+  <p:clrMapOvr>
+    <a:masterClrMapping/>
+  </p:clrMapOvr>
+</p:sld>
+</file>
+
+<file path=ppt/slides/slide12.xml><?xml version="1.0" encoding="utf-8"?>
 <p:sld xmlns:a="http://schemas.openxmlformats.org/drawingml/2006/main" xmlns:r="http://schemas.openxmlformats.org/officeDocument/2006/relationships" xmlns:p="http://schemas.openxmlformats.org/presentationml/2006/main">
   <p:cSld>
     <p:spTree>
@@ -4558,7 +4688,7 @@
               <a:rPr lang="fr-FR">
                 <a:latin typeface="Arial Rounded MT Bold" panose="020F0704030504030204" pitchFamily="34" charset="77"/>
               </a:rPr>
-              <a:t>11</a:t>
+              <a:t>12</a:t>
             </a:fld>
             <a:endParaRPr lang="fr-FR" dirty="0">
               <a:latin typeface="Arial Rounded MT Bold" panose="020F0704030504030204" pitchFamily="34" charset="77"/>
@@ -4596,6 +4726,69 @@
           </a:prstGeom>
         </p:spPr>
       </p:pic>
+      <p:sp>
+        <p:nvSpPr>
+          <p:cNvPr id="7" name="TextBox 6">
+            <a:extLst>
+              <a:ext uri="{FF2B5EF4-FFF2-40B4-BE49-F238E27FC236}">
+                <a16:creationId xmlns:a16="http://schemas.microsoft.com/office/drawing/2014/main" id="{9DBA1C52-DD10-6B06-AF85-FEF70BE75194}"/>
+              </a:ext>
+            </a:extLst>
+          </p:cNvPr>
+          <p:cNvSpPr txBox="1"/>
+          <p:nvPr/>
+        </p:nvSpPr>
+        <p:spPr>
+          <a:xfrm>
+            <a:off x="265386" y="964742"/>
+            <a:ext cx="7519713" cy="830997"/>
+          </a:xfrm>
+          <a:prstGeom prst="rect">
+            <a:avLst/>
+          </a:prstGeom>
+          <a:noFill/>
+        </p:spPr>
+        <p:txBody>
+          <a:bodyPr wrap="square">
+            <a:spAutoFit/>
+          </a:bodyPr>
+          <a:lstStyle/>
+          <a:p>
+            <a:r>
+              <a:rPr lang="en-US" sz="2400" dirty="0">
+                <a:solidFill>
+                  <a:schemeClr val="bg2">
+                    <a:lumMod val="25000"/>
+                  </a:schemeClr>
+                </a:solidFill>
+                <a:latin typeface="Arial Rounded MT Bold" panose="020F0704030504030204" pitchFamily="34" charset="77"/>
+              </a:rPr>
+              <a:t>PkBudg650</a:t>
+            </a:r>
+          </a:p>
+          <a:p>
+            <a:r>
+              <a:rPr lang="en-US" sz="2400" dirty="0">
+                <a:solidFill>
+                  <a:schemeClr val="bg2">
+                    <a:lumMod val="25000"/>
+                  </a:schemeClr>
+                </a:solidFill>
+                <a:latin typeface="Arial Rounded MT Bold" panose="020F0704030504030204" pitchFamily="34" charset="77"/>
+              </a:rPr>
+              <a:t>Material Flow, summed over the dimensions </a:t>
+            </a:r>
+            <a:endParaRPr lang="en-US" sz="2400" noProof="0" dirty="0">
+              <a:solidFill>
+                <a:schemeClr val="bg2">
+                  <a:lumMod val="25000"/>
+                </a:schemeClr>
+              </a:solidFill>
+              <a:latin typeface="Arial Rounded MT Bold" panose="020F0704030504030204" pitchFamily="34" charset="77"/>
+            </a:endParaRPr>
+          </a:p>
+        </p:txBody>
+      </p:sp>
     </p:spTree>
     <p:extLst>
       <p:ext uri="{BB962C8B-B14F-4D97-AF65-F5344CB8AC3E}">
@@ -4614,7 +4807,7 @@
 </p:sld>
 </file>
 
-<file path=ppt/slides/slide12.xml><?xml version="1.0" encoding="utf-8"?>
+<file path=ppt/slides/slide13.xml><?xml version="1.0" encoding="utf-8"?>
 <p:sld xmlns:a="http://schemas.openxmlformats.org/drawingml/2006/main" xmlns:r="http://schemas.openxmlformats.org/officeDocument/2006/relationships" xmlns:p="http://schemas.openxmlformats.org/presentationml/2006/main">
   <p:cSld>
     <p:spTree>
@@ -4661,6 +4854,77 @@
           </a:prstGeom>
         </p:spPr>
       </p:pic>
+      <p:sp>
+        <p:nvSpPr>
+          <p:cNvPr id="2" name="TextBox 1">
+            <a:extLst>
+              <a:ext uri="{FF2B5EF4-FFF2-40B4-BE49-F238E27FC236}">
+                <a16:creationId xmlns:a16="http://schemas.microsoft.com/office/drawing/2014/main" id="{EC2310DC-00E0-1304-5DD6-1131E9D81E5F}"/>
+              </a:ext>
+            </a:extLst>
+          </p:cNvPr>
+          <p:cNvSpPr txBox="1"/>
+          <p:nvPr/>
+        </p:nvSpPr>
+        <p:spPr>
+          <a:xfrm>
+            <a:off x="265386" y="964742"/>
+            <a:ext cx="7519713" cy="830997"/>
+          </a:xfrm>
+          <a:prstGeom prst="rect">
+            <a:avLst/>
+          </a:prstGeom>
+          <a:noFill/>
+        </p:spPr>
+        <p:txBody>
+          <a:bodyPr wrap="square">
+            <a:spAutoFit/>
+          </a:bodyPr>
+          <a:lstStyle/>
+          <a:p>
+            <a:r>
+              <a:rPr lang="en-US" sz="2400" dirty="0" err="1">
+                <a:solidFill>
+                  <a:schemeClr val="bg2">
+                    <a:lumMod val="25000"/>
+                  </a:schemeClr>
+                </a:solidFill>
+                <a:latin typeface="Arial Rounded MT Bold" panose="020F0704030504030204" pitchFamily="34" charset="77"/>
+              </a:rPr>
+              <a:t>NPi</a:t>
+            </a:r>
+            <a:endParaRPr lang="en-US" sz="2400" dirty="0">
+              <a:solidFill>
+                <a:schemeClr val="bg2">
+                  <a:lumMod val="25000"/>
+                </a:schemeClr>
+              </a:solidFill>
+              <a:latin typeface="Arial Rounded MT Bold" panose="020F0704030504030204" pitchFamily="34" charset="77"/>
+            </a:endParaRPr>
+          </a:p>
+          <a:p>
+            <a:r>
+              <a:rPr lang="en-US" sz="2400" dirty="0">
+                <a:solidFill>
+                  <a:schemeClr val="bg2">
+                    <a:lumMod val="25000"/>
+                  </a:schemeClr>
+                </a:solidFill>
+                <a:latin typeface="Arial Rounded MT Bold" panose="020F0704030504030204" pitchFamily="34" charset="77"/>
+              </a:rPr>
+              <a:t>Material Flow, summed over the dimensions </a:t>
+            </a:r>
+            <a:endParaRPr lang="en-US" sz="2400" noProof="0" dirty="0">
+              <a:solidFill>
+                <a:schemeClr val="bg2">
+                  <a:lumMod val="25000"/>
+                </a:schemeClr>
+              </a:solidFill>
+              <a:latin typeface="Arial Rounded MT Bold" panose="020F0704030504030204" pitchFamily="34" charset="77"/>
+            </a:endParaRPr>
+          </a:p>
+        </p:txBody>
+      </p:sp>
     </p:spTree>
     <p:extLst>
       <p:ext uri="{BB962C8B-B14F-4D97-AF65-F5344CB8AC3E}">
@@ -4679,7 +4943,7 @@
 </p:sld>
 </file>
 
-<file path=ppt/slides/slide13.xml><?xml version="1.0" encoding="utf-8"?>
+<file path=ppt/slides/slide14.xml><?xml version="1.0" encoding="utf-8"?>
 <p:sld xmlns:a="http://schemas.openxmlformats.org/drawingml/2006/main" xmlns:r="http://schemas.openxmlformats.org/officeDocument/2006/relationships" xmlns:p="http://schemas.openxmlformats.org/presentationml/2006/main">
   <p:cSld>
     <p:spTree>
@@ -4726,6 +4990,69 @@
           </a:prstGeom>
         </p:spPr>
       </p:pic>
+      <p:sp>
+        <p:nvSpPr>
+          <p:cNvPr id="2" name="TextBox 1">
+            <a:extLst>
+              <a:ext uri="{FF2B5EF4-FFF2-40B4-BE49-F238E27FC236}">
+                <a16:creationId xmlns:a16="http://schemas.microsoft.com/office/drawing/2014/main" id="{1CBC0978-77A7-FE59-A2F0-00F6723AC64D}"/>
+              </a:ext>
+            </a:extLst>
+          </p:cNvPr>
+          <p:cNvSpPr txBox="1"/>
+          <p:nvPr/>
+        </p:nvSpPr>
+        <p:spPr>
+          <a:xfrm>
+            <a:off x="265386" y="964742"/>
+            <a:ext cx="7519713" cy="830997"/>
+          </a:xfrm>
+          <a:prstGeom prst="rect">
+            <a:avLst/>
+          </a:prstGeom>
+          <a:noFill/>
+        </p:spPr>
+        <p:txBody>
+          <a:bodyPr wrap="square">
+            <a:spAutoFit/>
+          </a:bodyPr>
+          <a:lstStyle/>
+          <a:p>
+            <a:r>
+              <a:rPr lang="en-US" sz="2400" dirty="0">
+                <a:solidFill>
+                  <a:schemeClr val="bg2">
+                    <a:lumMod val="25000"/>
+                  </a:schemeClr>
+                </a:solidFill>
+                <a:latin typeface="Arial Rounded MT Bold" panose="020F0704030504030204" pitchFamily="34" charset="77"/>
+              </a:rPr>
+              <a:t>2020 </a:t>
+            </a:r>
+          </a:p>
+          <a:p>
+            <a:r>
+              <a:rPr lang="en-US" sz="2400" dirty="0">
+                <a:solidFill>
+                  <a:schemeClr val="bg2">
+                    <a:lumMod val="25000"/>
+                  </a:schemeClr>
+                </a:solidFill>
+                <a:latin typeface="Arial Rounded MT Bold" panose="020F0704030504030204" pitchFamily="34" charset="77"/>
+              </a:rPr>
+              <a:t>Material Flow, summed over the dimensions </a:t>
+            </a:r>
+            <a:endParaRPr lang="en-US" sz="2400" noProof="0" dirty="0">
+              <a:solidFill>
+                <a:schemeClr val="bg2">
+                  <a:lumMod val="25000"/>
+                </a:schemeClr>
+              </a:solidFill>
+              <a:latin typeface="Arial Rounded MT Bold" panose="020F0704030504030204" pitchFamily="34" charset="77"/>
+            </a:endParaRPr>
+          </a:p>
+        </p:txBody>
+      </p:sp>
     </p:spTree>
     <p:extLst>
       <p:ext uri="{BB962C8B-B14F-4D97-AF65-F5344CB8AC3E}">
@@ -4744,7 +5071,7 @@
 </p:sld>
 </file>
 
-<file path=ppt/slides/slide14.xml><?xml version="1.0" encoding="utf-8"?>
+<file path=ppt/slides/slide15.xml><?xml version="1.0" encoding="utf-8"?>
 <p:sld xmlns:a="http://schemas.openxmlformats.org/drawingml/2006/main" xmlns:r="http://schemas.openxmlformats.org/officeDocument/2006/relationships" xmlns:p="http://schemas.openxmlformats.org/presentationml/2006/main">
   <p:cSld>
     <p:spTree>
@@ -4791,6 +5118,69 @@
           </a:prstGeom>
         </p:spPr>
       </p:pic>
+      <p:sp>
+        <p:nvSpPr>
+          <p:cNvPr id="2" name="TextBox 1">
+            <a:extLst>
+              <a:ext uri="{FF2B5EF4-FFF2-40B4-BE49-F238E27FC236}">
+                <a16:creationId xmlns:a16="http://schemas.microsoft.com/office/drawing/2014/main" id="{E432E2A6-AC35-8DCE-9CC4-CAD9DFB7EFA5}"/>
+              </a:ext>
+            </a:extLst>
+          </p:cNvPr>
+          <p:cNvSpPr txBox="1"/>
+          <p:nvPr/>
+        </p:nvSpPr>
+        <p:spPr>
+          <a:xfrm>
+            <a:off x="265386" y="964742"/>
+            <a:ext cx="7519713" cy="830997"/>
+          </a:xfrm>
+          <a:prstGeom prst="rect">
+            <a:avLst/>
+          </a:prstGeom>
+          <a:noFill/>
+        </p:spPr>
+        <p:txBody>
+          <a:bodyPr wrap="square">
+            <a:spAutoFit/>
+          </a:bodyPr>
+          <a:lstStyle/>
+          <a:p>
+            <a:r>
+              <a:rPr lang="en-US" sz="2400" dirty="0">
+                <a:solidFill>
+                  <a:schemeClr val="bg2">
+                    <a:lumMod val="25000"/>
+                  </a:schemeClr>
+                </a:solidFill>
+                <a:latin typeface="Arial Rounded MT Bold" panose="020F0704030504030204" pitchFamily="34" charset="77"/>
+              </a:rPr>
+              <a:t>2035 </a:t>
+            </a:r>
+          </a:p>
+          <a:p>
+            <a:r>
+              <a:rPr lang="en-US" sz="2400" dirty="0">
+                <a:solidFill>
+                  <a:schemeClr val="bg2">
+                    <a:lumMod val="25000"/>
+                  </a:schemeClr>
+                </a:solidFill>
+                <a:latin typeface="Arial Rounded MT Bold" panose="020F0704030504030204" pitchFamily="34" charset="77"/>
+              </a:rPr>
+              <a:t>Material Flow, summed over the dimensions </a:t>
+            </a:r>
+            <a:endParaRPr lang="en-US" sz="2400" noProof="0" dirty="0">
+              <a:solidFill>
+                <a:schemeClr val="bg2">
+                  <a:lumMod val="25000"/>
+                </a:schemeClr>
+              </a:solidFill>
+              <a:latin typeface="Arial Rounded MT Bold" panose="020F0704030504030204" pitchFamily="34" charset="77"/>
+            </a:endParaRPr>
+          </a:p>
+        </p:txBody>
+      </p:sp>
     </p:spTree>
     <p:extLst>
       <p:ext uri="{BB962C8B-B14F-4D97-AF65-F5344CB8AC3E}">
@@ -4809,7 +5199,7 @@
 </p:sld>
 </file>
 
-<file path=ppt/slides/slide15.xml><?xml version="1.0" encoding="utf-8"?>
+<file path=ppt/slides/slide16.xml><?xml version="1.0" encoding="utf-8"?>
 <p:sld xmlns:a="http://schemas.openxmlformats.org/drawingml/2006/main" xmlns:r="http://schemas.openxmlformats.org/officeDocument/2006/relationships" xmlns:p="http://schemas.openxmlformats.org/presentationml/2006/main">
   <p:cSld>
     <p:spTree>
@@ -4856,6 +5246,69 @@
           </a:prstGeom>
         </p:spPr>
       </p:pic>
+      <p:sp>
+        <p:nvSpPr>
+          <p:cNvPr id="2" name="TextBox 1">
+            <a:extLst>
+              <a:ext uri="{FF2B5EF4-FFF2-40B4-BE49-F238E27FC236}">
+                <a16:creationId xmlns:a16="http://schemas.microsoft.com/office/drawing/2014/main" id="{35326718-3575-5641-B71D-7EF28457C227}"/>
+              </a:ext>
+            </a:extLst>
+          </p:cNvPr>
+          <p:cNvSpPr txBox="1"/>
+          <p:nvPr/>
+        </p:nvSpPr>
+        <p:spPr>
+          <a:xfrm>
+            <a:off x="265386" y="964742"/>
+            <a:ext cx="7519713" cy="830997"/>
+          </a:xfrm>
+          <a:prstGeom prst="rect">
+            <a:avLst/>
+          </a:prstGeom>
+          <a:noFill/>
+        </p:spPr>
+        <p:txBody>
+          <a:bodyPr wrap="square">
+            <a:spAutoFit/>
+          </a:bodyPr>
+          <a:lstStyle/>
+          <a:p>
+            <a:r>
+              <a:rPr lang="en-US" sz="2400" dirty="0">
+                <a:solidFill>
+                  <a:schemeClr val="bg2">
+                    <a:lumMod val="25000"/>
+                  </a:schemeClr>
+                </a:solidFill>
+                <a:latin typeface="Arial Rounded MT Bold" panose="020F0704030504030204" pitchFamily="34" charset="77"/>
+              </a:rPr>
+              <a:t>2045 </a:t>
+            </a:r>
+          </a:p>
+          <a:p>
+            <a:r>
+              <a:rPr lang="en-US" sz="2400" dirty="0">
+                <a:solidFill>
+                  <a:schemeClr val="bg2">
+                    <a:lumMod val="25000"/>
+                  </a:schemeClr>
+                </a:solidFill>
+                <a:latin typeface="Arial Rounded MT Bold" panose="020F0704030504030204" pitchFamily="34" charset="77"/>
+              </a:rPr>
+              <a:t>Material Flow, summed over the dimensions </a:t>
+            </a:r>
+            <a:endParaRPr lang="en-US" sz="2400" noProof="0" dirty="0">
+              <a:solidFill>
+                <a:schemeClr val="bg2">
+                  <a:lumMod val="25000"/>
+                </a:schemeClr>
+              </a:solidFill>
+              <a:latin typeface="Arial Rounded MT Bold" panose="020F0704030504030204" pitchFamily="34" charset="77"/>
+            </a:endParaRPr>
+          </a:p>
+        </p:txBody>
+      </p:sp>
     </p:spTree>
     <p:extLst>
       <p:ext uri="{BB962C8B-B14F-4D97-AF65-F5344CB8AC3E}">

</xml_diff>

<commit_message>
update presentation MFA graphs
</commit_message>
<xml_diff>
--- a/presentation/dds_autumn_school_2025_paw_presentation_14-11-2025.pptx
+++ b/presentation/dds_autumn_school_2025_paw_presentation_14-11-2025.pptx
@@ -4960,36 +4960,6 @@
           <a:chExt cx="0" cy="0"/>
         </a:xfrm>
       </p:grpSpPr>
-      <p:pic>
-        <p:nvPicPr>
-          <p:cNvPr id="3" name="Picture 2" descr="A diagram of different colored lines&#10;&#10;AI-generated content may be incorrect.">
-            <a:extLst>
-              <a:ext uri="{FF2B5EF4-FFF2-40B4-BE49-F238E27FC236}">
-                <a16:creationId xmlns:a16="http://schemas.microsoft.com/office/drawing/2014/main" id="{AFDB750F-6FB4-7635-C786-8FC851DAA611}"/>
-              </a:ext>
-            </a:extLst>
-          </p:cNvPr>
-          <p:cNvPicPr>
-            <a:picLocks noChangeAspect="1"/>
-          </p:cNvPicPr>
-          <p:nvPr/>
-        </p:nvPicPr>
-        <p:blipFill>
-          <a:blip r:embed="rId3"/>
-          <a:stretch>
-            <a:fillRect/>
-          </a:stretch>
-        </p:blipFill>
-        <p:spPr>
-          <a:xfrm>
-            <a:off x="0" y="1526642"/>
-            <a:ext cx="12192000" cy="3804716"/>
-          </a:xfrm>
-          <a:prstGeom prst="rect">
-            <a:avLst/>
-          </a:prstGeom>
-        </p:spPr>
-      </p:pic>
       <p:sp>
         <p:nvSpPr>
           <p:cNvPr id="2" name="TextBox 1">
@@ -5053,6 +5023,36 @@
           </a:p>
         </p:txBody>
       </p:sp>
+      <p:pic>
+        <p:nvPicPr>
+          <p:cNvPr id="4" name="Image 3">
+            <a:extLst>
+              <a:ext uri="{FF2B5EF4-FFF2-40B4-BE49-F238E27FC236}">
+                <a16:creationId xmlns:a16="http://schemas.microsoft.com/office/drawing/2014/main" id="{29745990-553C-14C4-C7E3-6C43485CEF8F}"/>
+              </a:ext>
+            </a:extLst>
+          </p:cNvPr>
+          <p:cNvPicPr>
+            <a:picLocks noChangeAspect="1"/>
+          </p:cNvPicPr>
+          <p:nvPr/>
+        </p:nvPicPr>
+        <p:blipFill>
+          <a:blip r:embed="rId3"/>
+          <a:stretch>
+            <a:fillRect/>
+          </a:stretch>
+        </p:blipFill>
+        <p:spPr>
+          <a:xfrm>
+            <a:off x="265386" y="1795739"/>
+            <a:ext cx="11536001" cy="3600000"/>
+          </a:xfrm>
+          <a:prstGeom prst="rect">
+            <a:avLst/>
+          </a:prstGeom>
+        </p:spPr>
+      </p:pic>
     </p:spTree>
     <p:extLst>
       <p:ext uri="{BB962C8B-B14F-4D97-AF65-F5344CB8AC3E}">
@@ -5088,36 +5088,6 @@
           <a:chExt cx="0" cy="0"/>
         </a:xfrm>
       </p:grpSpPr>
-      <p:pic>
-        <p:nvPicPr>
-          <p:cNvPr id="3" name="Picture 2" descr="A diagram of different colored lines&#10;&#10;AI-generated content may be incorrect.">
-            <a:extLst>
-              <a:ext uri="{FF2B5EF4-FFF2-40B4-BE49-F238E27FC236}">
-                <a16:creationId xmlns:a16="http://schemas.microsoft.com/office/drawing/2014/main" id="{1865928E-9A82-7D7F-B570-F36C38BCC06D}"/>
-              </a:ext>
-            </a:extLst>
-          </p:cNvPr>
-          <p:cNvPicPr>
-            <a:picLocks noChangeAspect="1"/>
-          </p:cNvPicPr>
-          <p:nvPr/>
-        </p:nvPicPr>
-        <p:blipFill>
-          <a:blip r:embed="rId3"/>
-          <a:stretch>
-            <a:fillRect/>
-          </a:stretch>
-        </p:blipFill>
-        <p:spPr>
-          <a:xfrm>
-            <a:off x="0" y="1526642"/>
-            <a:ext cx="12192000" cy="3804716"/>
-          </a:xfrm>
-          <a:prstGeom prst="rect">
-            <a:avLst/>
-          </a:prstGeom>
-        </p:spPr>
-      </p:pic>
       <p:sp>
         <p:nvSpPr>
           <p:cNvPr id="2" name="TextBox 1">
@@ -5181,6 +5151,36 @@
           </a:p>
         </p:txBody>
       </p:sp>
+      <p:pic>
+        <p:nvPicPr>
+          <p:cNvPr id="4" name="Image 3">
+            <a:extLst>
+              <a:ext uri="{FF2B5EF4-FFF2-40B4-BE49-F238E27FC236}">
+                <a16:creationId xmlns:a16="http://schemas.microsoft.com/office/drawing/2014/main" id="{4DA1CC83-5206-BE58-0F46-E2A8C0090B1E}"/>
+              </a:ext>
+            </a:extLst>
+          </p:cNvPr>
+          <p:cNvPicPr>
+            <a:picLocks noChangeAspect="1"/>
+          </p:cNvPicPr>
+          <p:nvPr/>
+        </p:nvPicPr>
+        <p:blipFill>
+          <a:blip r:embed="rId3"/>
+          <a:stretch>
+            <a:fillRect/>
+          </a:stretch>
+        </p:blipFill>
+        <p:spPr>
+          <a:xfrm>
+            <a:off x="139042" y="1795739"/>
+            <a:ext cx="11536001" cy="3600000"/>
+          </a:xfrm>
+          <a:prstGeom prst="rect">
+            <a:avLst/>
+          </a:prstGeom>
+        </p:spPr>
+      </p:pic>
     </p:spTree>
     <p:extLst>
       <p:ext uri="{BB962C8B-B14F-4D97-AF65-F5344CB8AC3E}">
@@ -5216,36 +5216,6 @@
           <a:chExt cx="0" cy="0"/>
         </a:xfrm>
       </p:grpSpPr>
-      <p:pic>
-        <p:nvPicPr>
-          <p:cNvPr id="3" name="Picture 2" descr="A close-up of a diagram&#10;&#10;AI-generated content may be incorrect.">
-            <a:extLst>
-              <a:ext uri="{FF2B5EF4-FFF2-40B4-BE49-F238E27FC236}">
-                <a16:creationId xmlns:a16="http://schemas.microsoft.com/office/drawing/2014/main" id="{BE855E42-AACD-6673-E0BE-465336C2F697}"/>
-              </a:ext>
-            </a:extLst>
-          </p:cNvPr>
-          <p:cNvPicPr>
-            <a:picLocks noChangeAspect="1"/>
-          </p:cNvPicPr>
-          <p:nvPr/>
-        </p:nvPicPr>
-        <p:blipFill>
-          <a:blip r:embed="rId3"/>
-          <a:stretch>
-            <a:fillRect/>
-          </a:stretch>
-        </p:blipFill>
-        <p:spPr>
-          <a:xfrm>
-            <a:off x="0" y="1526642"/>
-            <a:ext cx="12192000" cy="3804716"/>
-          </a:xfrm>
-          <a:prstGeom prst="rect">
-            <a:avLst/>
-          </a:prstGeom>
-        </p:spPr>
-      </p:pic>
       <p:sp>
         <p:nvSpPr>
           <p:cNvPr id="2" name="TextBox 1">
@@ -5309,6 +5279,36 @@
           </a:p>
         </p:txBody>
       </p:sp>
+      <p:pic>
+        <p:nvPicPr>
+          <p:cNvPr id="4" name="Image 3">
+            <a:extLst>
+              <a:ext uri="{FF2B5EF4-FFF2-40B4-BE49-F238E27FC236}">
+                <a16:creationId xmlns:a16="http://schemas.microsoft.com/office/drawing/2014/main" id="{79A87C96-10A6-E4D8-FEBF-DE309B80E2E3}"/>
+              </a:ext>
+            </a:extLst>
+          </p:cNvPr>
+          <p:cNvPicPr>
+            <a:picLocks noChangeAspect="1"/>
+          </p:cNvPicPr>
+          <p:nvPr/>
+        </p:nvPicPr>
+        <p:blipFill>
+          <a:blip r:embed="rId3"/>
+          <a:stretch>
+            <a:fillRect/>
+          </a:stretch>
+        </p:blipFill>
+        <p:spPr>
+          <a:xfrm>
+            <a:off x="265386" y="1795739"/>
+            <a:ext cx="11536001" cy="3600000"/>
+          </a:xfrm>
+          <a:prstGeom prst="rect">
+            <a:avLst/>
+          </a:prstGeom>
+        </p:spPr>
+      </p:pic>
     </p:spTree>
     <p:extLst>
       <p:ext uri="{BB962C8B-B14F-4D97-AF65-F5344CB8AC3E}">
@@ -5496,7 +5496,7 @@
                 </a:solidFill>
                 <a:latin typeface="+mj-lt"/>
               </a:rPr>
-              <a:t>Conclusion and perspectives</a:t>
+              <a:t>Conclusion</a:t>
             </a:r>
           </a:p>
         </p:txBody>

</xml_diff>

<commit_message>
updated presentation MFA charts
</commit_message>
<xml_diff>
--- a/presentation/dds_autumn_school_2025_paw_presentation_14-11-2025.pptx
+++ b/presentation/dds_autumn_school_2025_paw_presentation_14-11-2025.pptx
@@ -5102,7 +5102,7 @@
         </p:nvSpPr>
         <p:spPr>
           <a:xfrm>
-            <a:off x="265386" y="964742"/>
+            <a:off x="293961" y="964742"/>
             <a:ext cx="7519713" cy="830997"/>
           </a:xfrm>
           <a:prstGeom prst="rect">
@@ -5704,7 +5704,7 @@
           </a:bodyPr>
           <a:lstStyle/>
           <a:p>
-            <a:pPr marL="457200" indent="-457200">
+            <a:pPr marL="457200" indent="-457200" algn="just">
               <a:buFont typeface="Wingdings" pitchFamily="2" charset="2"/>
               <a:buChar char="ü"/>
             </a:pPr>

</xml_diff>

<commit_message>
Changed the overview/plan of the presentation to better reflect the actual presentation
</commit_message>
<xml_diff>
--- a/presentation/dds_autumn_school_2025_paw_presentation_14-11-2025.pptx
+++ b/presentation/dds_autumn_school_2025_paw_presentation_14-11-2025.pptx
@@ -154,7 +154,7 @@
   <pc:docChgLst>
     <pc:chgData name="David CLOUSIER" userId="768240c1-c1f0-4ea5-ba36-477fb0372b02" providerId="ADAL" clId="{CA5A136D-3B77-4157-88EA-9B5DC776E31F}"/>
     <pc:docChg chg="undo redo custSel addSld delSld modSld sldOrd">
-      <pc:chgData name="David CLOUSIER" userId="768240c1-c1f0-4ea5-ba36-477fb0372b02" providerId="ADAL" clId="{CA5A136D-3B77-4157-88EA-9B5DC776E31F}" dt="2025-11-14T12:57:40.359" v="931" actId="1076"/>
+      <pc:chgData name="David CLOUSIER" userId="768240c1-c1f0-4ea5-ba36-477fb0372b02" providerId="ADAL" clId="{CA5A136D-3B77-4157-88EA-9B5DC776E31F}" dt="2025-11-14T13:50:30.733" v="965" actId="20577"/>
       <pc:docMkLst>
         <pc:docMk/>
       </pc:docMkLst>
@@ -319,6 +319,21 @@
             <ac:picMk id="5" creationId="{7259F870-464B-9419-6C85-DFFC837F7B0E}"/>
           </ac:picMkLst>
         </pc:picChg>
+      </pc:sldChg>
+      <pc:sldChg chg="modSp mod">
+        <pc:chgData name="David CLOUSIER" userId="768240c1-c1f0-4ea5-ba36-477fb0372b02" providerId="ADAL" clId="{CA5A136D-3B77-4157-88EA-9B5DC776E31F}" dt="2025-11-14T13:50:30.733" v="965" actId="20577"/>
+        <pc:sldMkLst>
+          <pc:docMk/>
+          <pc:sldMk cId="482031180" sldId="263"/>
+        </pc:sldMkLst>
+        <pc:spChg chg="mod">
+          <ac:chgData name="David CLOUSIER" userId="768240c1-c1f0-4ea5-ba36-477fb0372b02" providerId="ADAL" clId="{CA5A136D-3B77-4157-88EA-9B5DC776E31F}" dt="2025-11-14T13:50:30.733" v="965" actId="20577"/>
+          <ac:spMkLst>
+            <pc:docMk/>
+            <pc:sldMk cId="482031180" sldId="263"/>
+            <ac:spMk id="4" creationId="{7AFF4E7E-FF8B-7A6A-9E38-17F4300EE873}"/>
+          </ac:spMkLst>
+        </pc:spChg>
       </pc:sldChg>
       <pc:sldChg chg="modSp mod">
         <pc:chgData name="David CLOUSIER" userId="768240c1-c1f0-4ea5-ba36-477fb0372b02" providerId="ADAL" clId="{CA5A136D-3B77-4157-88EA-9B5DC776E31F}" dt="2025-11-14T12:36:09.387" v="370" actId="1076"/>
@@ -795,7 +810,7 @@
 <file path=ppt/charts/chart1.xml><?xml version="1.0" encoding="utf-8"?>
 <c:chartSpace xmlns:c="http://schemas.openxmlformats.org/drawingml/2006/chart" xmlns:a="http://schemas.openxmlformats.org/drawingml/2006/main" xmlns:r="http://schemas.openxmlformats.org/officeDocument/2006/relationships" xmlns:c16r2="http://schemas.microsoft.com/office/drawing/2015/06/chart">
   <c:date1904 val="0"/>
-  <c:lang val="de-DE"/>
+  <c:lang val="en-US"/>
   <c:roundedCorners val="0"/>
   <mc:AlternateContent xmlns:mc="http://schemas.openxmlformats.org/markup-compatibility/2006">
     <mc:Choice xmlns:c14="http://schemas.microsoft.com/office/drawing/2007/8/2/chart" Requires="c14">
@@ -1110,6 +1125,7 @@
     </c:plotArea>
     <c:plotVisOnly val="1"/>
     <c:dispBlanksAs val="gap"/>
+    <c:showDLblsOverMax val="0"/>
     <c:extLst>
       <c:ext xmlns:c16r3="http://schemas.microsoft.com/office/drawing/2017/03/chart" uri="{56B9EC1D-385E-4148-901F-78D8002777C0}">
         <c16r3:dataDisplayOptions16>
@@ -1117,7 +1133,6 @@
         </c16r3:dataDisplayOptions16>
       </c:ext>
     </c:extLst>
-    <c:showDLblsOverMax val="0"/>
   </c:chart>
   <c:spPr>
     <a:noFill/>
@@ -1145,7 +1160,7 @@
 <file path=ppt/charts/chart2.xml><?xml version="1.0" encoding="utf-8"?>
 <c:chartSpace xmlns:c="http://schemas.openxmlformats.org/drawingml/2006/chart" xmlns:a="http://schemas.openxmlformats.org/drawingml/2006/main" xmlns:r="http://schemas.openxmlformats.org/officeDocument/2006/relationships" xmlns:c16r2="http://schemas.microsoft.com/office/drawing/2015/06/chart">
   <c:date1904 val="0"/>
-  <c:lang val="de-DE"/>
+  <c:lang val="en-US"/>
   <c:roundedCorners val="0"/>
   <mc:AlternateContent xmlns:mc="http://schemas.openxmlformats.org/markup-compatibility/2006">
     <mc:Choice xmlns:c14="http://schemas.microsoft.com/office/drawing/2007/8/2/chart" Requires="c14">
@@ -1485,6 +1500,7 @@
     </c:plotArea>
     <c:plotVisOnly val="1"/>
     <c:dispBlanksAs val="gap"/>
+    <c:showDLblsOverMax val="0"/>
     <c:extLst>
       <c:ext xmlns:c16r3="http://schemas.microsoft.com/office/drawing/2017/03/chart" uri="{56B9EC1D-385E-4148-901F-78D8002777C0}">
         <c16r3:dataDisplayOptions16>
@@ -1492,7 +1508,6 @@
         </c16r3:dataDisplayOptions16>
       </c:ext>
     </c:extLst>
-    <c:showDLblsOverMax val="0"/>
   </c:chart>
   <c:spPr>
     <a:noFill/>
@@ -2865,7 +2880,7 @@
           <a:p>
             <a:fld id="{A0D929E6-8A8A-7849-B07E-EF3F10F499E1}" type="slidenum">
               <a:rPr lang="fr-FR" smtClean="0"/>
-              <a:t>‹Nr.›</a:t>
+              <a:t>‹#›</a:t>
             </a:fld>
             <a:endParaRPr lang="fr-FR"/>
           </a:p>
@@ -3175,7 +3190,7 @@
           <a:p>
             <a:fld id="{778F5207-2293-314B-95F1-12759B93D428}" type="slidenum">
               <a:rPr lang="fr-FR" smtClean="0"/>
-              <a:t>‹Nr.›</a:t>
+              <a:t>‹#›</a:t>
             </a:fld>
             <a:endParaRPr lang="fr-FR"/>
           </a:p>
@@ -3373,7 +3388,7 @@
           <a:p>
             <a:fld id="{778F5207-2293-314B-95F1-12759B93D428}" type="slidenum">
               <a:rPr lang="fr-FR" smtClean="0"/>
-              <a:t>‹Nr.›</a:t>
+              <a:t>‹#›</a:t>
             </a:fld>
             <a:endParaRPr lang="fr-FR"/>
           </a:p>
@@ -3581,7 +3596,7 @@
           <a:p>
             <a:fld id="{778F5207-2293-314B-95F1-12759B93D428}" type="slidenum">
               <a:rPr lang="fr-FR" smtClean="0"/>
-              <a:t>‹Nr.›</a:t>
+              <a:t>‹#›</a:t>
             </a:fld>
             <a:endParaRPr lang="fr-FR"/>
           </a:p>
@@ -3779,7 +3794,7 @@
           <a:p>
             <a:fld id="{778F5207-2293-314B-95F1-12759B93D428}" type="slidenum">
               <a:rPr lang="fr-FR" smtClean="0"/>
-              <a:t>‹Nr.›</a:t>
+              <a:t>‹#›</a:t>
             </a:fld>
             <a:endParaRPr lang="fr-FR"/>
           </a:p>
@@ -4054,7 +4069,7 @@
           <a:p>
             <a:fld id="{778F5207-2293-314B-95F1-12759B93D428}" type="slidenum">
               <a:rPr lang="fr-FR" smtClean="0"/>
-              <a:t>‹Nr.›</a:t>
+              <a:t>‹#›</a:t>
             </a:fld>
             <a:endParaRPr lang="fr-FR"/>
           </a:p>
@@ -4319,7 +4334,7 @@
           <a:p>
             <a:fld id="{778F5207-2293-314B-95F1-12759B93D428}" type="slidenum">
               <a:rPr lang="fr-FR" smtClean="0"/>
-              <a:t>‹Nr.›</a:t>
+              <a:t>‹#›</a:t>
             </a:fld>
             <a:endParaRPr lang="fr-FR"/>
           </a:p>
@@ -4731,7 +4746,7 @@
           <a:p>
             <a:fld id="{778F5207-2293-314B-95F1-12759B93D428}" type="slidenum">
               <a:rPr lang="fr-FR" smtClean="0"/>
-              <a:t>‹Nr.›</a:t>
+              <a:t>‹#›</a:t>
             </a:fld>
             <a:endParaRPr lang="fr-FR"/>
           </a:p>
@@ -4872,7 +4887,7 @@
           <a:p>
             <a:fld id="{778F5207-2293-314B-95F1-12759B93D428}" type="slidenum">
               <a:rPr lang="fr-FR" smtClean="0"/>
-              <a:t>‹Nr.›</a:t>
+              <a:t>‹#›</a:t>
             </a:fld>
             <a:endParaRPr lang="fr-FR"/>
           </a:p>
@@ -4996,7 +5011,7 @@
                 <a:latin typeface="Arial Rounded MT Bold" panose="020F0704030504030204" pitchFamily="34" charset="77"/>
               </a:rPr>
               <a:pPr/>
-              <a:t>‹Nr.›</a:t>
+              <a:t>‹#›</a:t>
             </a:fld>
             <a:r>
               <a:rPr lang="fr-FR" dirty="0"/>
@@ -5438,7 +5453,7 @@
           <a:p>
             <a:fld id="{778F5207-2293-314B-95F1-12759B93D428}" type="slidenum">
               <a:rPr lang="fr-FR" smtClean="0"/>
-              <a:t>‹Nr.›</a:t>
+              <a:t>‹#›</a:t>
             </a:fld>
             <a:endParaRPr lang="fr-FR"/>
           </a:p>
@@ -5726,7 +5741,7 @@
           <a:p>
             <a:fld id="{778F5207-2293-314B-95F1-12759B93D428}" type="slidenum">
               <a:rPr lang="fr-FR" smtClean="0"/>
-              <a:t>‹Nr.›</a:t>
+              <a:t>‹#›</a:t>
             </a:fld>
             <a:endParaRPr lang="fr-FR"/>
           </a:p>
@@ -6003,7 +6018,7 @@
           <a:p>
             <a:fld id="{778F5207-2293-314B-95F1-12759B93D428}" type="slidenum">
               <a:rPr lang="fr-FR" smtClean="0"/>
-              <a:t>‹Nr.›</a:t>
+              <a:t>‹#›</a:t>
             </a:fld>
             <a:endParaRPr lang="fr-FR"/>
           </a:p>
@@ -6835,7 +6850,7 @@
           <p:nvPr/>
         </p:nvPicPr>
         <p:blipFill>
-          <a:blip r:embed="rId2"/>
+          <a:blip r:embed="rId3"/>
           <a:stretch>
             <a:fillRect/>
           </a:stretch>
@@ -6927,7 +6942,7 @@
   </p:clrMapOvr>
   <p:extLst>
     <p:ext uri="{6950BFC3-D8DA-4A85-94F7-54DA5524770B}">
-      <p188:commentRel xmlns:p188="http://schemas.microsoft.com/office/powerpoint/2018/8/main" xmlns="" r:id="rId3"/>
+      <p188:commentRel xmlns:p188="http://schemas.microsoft.com/office/powerpoint/2018/8/main" r:id="rId2"/>
     </p:ext>
   </p:extLst>
 </p:sld>
@@ -7918,12 +7933,12 @@
           <a:graphicData uri="http://schemas.openxmlformats.org/presentationml/2006/ole">
             <mc:AlternateContent xmlns:mc="http://schemas.openxmlformats.org/markup-compatibility/2006">
               <mc:Choice xmlns:v="urn:schemas-microsoft-com:vml" Requires="v">
-                <p:oleObj spid="_x0000_s1032" name="Packager Shell Object" showAsIcon="1" r:id="rId3" imgW="2438400" imgH="518018" progId="Package">
+                <p:oleObj name="Packager Shell Object" showAsIcon="1" r:id="rId2" imgW="2438400" imgH="518018" progId="Package">
                   <p:embed/>
                 </p:oleObj>
               </mc:Choice>
               <mc:Fallback>
-                <p:oleObj name="Packager Shell Object" showAsIcon="1" r:id="rId3" imgW="2438400" imgH="518018" progId="Package">
+                <p:oleObj name="Packager Shell Object" showAsIcon="1" r:id="rId2" imgW="2438400" imgH="518018" progId="Package">
                   <p:embed/>
                   <p:pic>
                     <p:nvPicPr>
@@ -7938,7 +7953,7 @@
                       <p:nvPr/>
                     </p:nvPicPr>
                     <p:blipFill>
-                      <a:blip r:embed="rId4"/>
+                      <a:blip r:embed="rId3"/>
                       <a:stretch>
                         <a:fillRect/>
                       </a:stretch>
@@ -13653,12 +13668,12 @@
           <a:graphicData uri="http://schemas.openxmlformats.org/presentationml/2006/ole">
             <mc:AlternateContent xmlns:mc="http://schemas.openxmlformats.org/markup-compatibility/2006">
               <mc:Choice xmlns:v="urn:schemas-microsoft-com:vml" Requires="v">
-                <p:oleObj spid="_x0000_s2056" name="Packager Shell Object" showAsIcon="1" r:id="rId3" imgW="2438400" imgH="518018" progId="Package">
+                <p:oleObj name="Packager Shell Object" showAsIcon="1" r:id="rId2" imgW="2438400" imgH="518018" progId="Package">
                   <p:embed/>
                 </p:oleObj>
               </mc:Choice>
               <mc:Fallback>
-                <p:oleObj name="Packager Shell Object" showAsIcon="1" r:id="rId3" imgW="2438400" imgH="518018" progId="Package">
+                <p:oleObj name="Packager Shell Object" showAsIcon="1" r:id="rId2" imgW="2438400" imgH="518018" progId="Package">
                   <p:embed/>
                   <p:pic>
                     <p:nvPicPr>
@@ -13673,7 +13688,7 @@
                       <p:nvPr/>
                     </p:nvPicPr>
                     <p:blipFill>
-                      <a:blip r:embed="rId4"/>
+                      <a:blip r:embed="rId3"/>
                       <a:stretch>
                         <a:fillRect/>
                       </a:stretch>
@@ -13826,12 +13841,12 @@
           <a:graphicData uri="http://schemas.openxmlformats.org/presentationml/2006/ole">
             <mc:AlternateContent xmlns:mc="http://schemas.openxmlformats.org/markup-compatibility/2006">
               <mc:Choice xmlns:v="urn:schemas-microsoft-com:vml" Requires="v">
-                <p:oleObj spid="_x0000_s3080" name="Packager Shell Object" showAsIcon="1" r:id="rId3" imgW="2438400" imgH="518018" progId="Package">
+                <p:oleObj name="Packager Shell Object" showAsIcon="1" r:id="rId2" imgW="2438400" imgH="518018" progId="Package">
                   <p:embed/>
                 </p:oleObj>
               </mc:Choice>
               <mc:Fallback>
-                <p:oleObj name="Packager Shell Object" showAsIcon="1" r:id="rId3" imgW="2438400" imgH="518018" progId="Package">
+                <p:oleObj name="Packager Shell Object" showAsIcon="1" r:id="rId2" imgW="2438400" imgH="518018" progId="Package">
                   <p:embed/>
                   <p:pic>
                     <p:nvPicPr>
@@ -13846,7 +13861,7 @@
                       <p:nvPr/>
                     </p:nvPicPr>
                     <p:blipFill>
-                      <a:blip r:embed="rId4"/>
+                      <a:blip r:embed="rId3"/>
                       <a:stretch>
                         <a:fillRect/>
                       </a:stretch>
@@ -16311,12 +16326,12 @@
           <a:graphicData uri="http://schemas.openxmlformats.org/presentationml/2006/ole">
             <mc:AlternateContent xmlns:mc="http://schemas.openxmlformats.org/markup-compatibility/2006">
               <mc:Choice xmlns:v="urn:schemas-microsoft-com:vml" Requires="v">
-                <p:oleObj spid="_x0000_s4104" name="Packager Shell Object" showAsIcon="1" r:id="rId3" imgW="2438400" imgH="518018" progId="Package">
+                <p:oleObj name="Packager Shell Object" showAsIcon="1" r:id="rId2" imgW="2438400" imgH="518018" progId="Package">
                   <p:embed/>
                 </p:oleObj>
               </mc:Choice>
               <mc:Fallback>
-                <p:oleObj name="Packager Shell Object" showAsIcon="1" r:id="rId3" imgW="2438400" imgH="518018" progId="Package">
+                <p:oleObj name="Packager Shell Object" showAsIcon="1" r:id="rId2" imgW="2438400" imgH="518018" progId="Package">
                   <p:embed/>
                   <p:pic>
                     <p:nvPicPr>
@@ -16331,7 +16346,7 @@
                       <p:nvPr/>
                     </p:nvPicPr>
                     <p:blipFill>
-                      <a:blip r:embed="rId4"/>
+                      <a:blip r:embed="rId3"/>
                       <a:stretch>
                         <a:fillRect/>
                       </a:stretch>
@@ -19154,7 +19169,7 @@
         <p:spPr>
           <a:xfrm>
             <a:off x="1918010" y="1970048"/>
-            <a:ext cx="9166302" cy="2610843"/>
+            <a:ext cx="9166302" cy="3257174"/>
           </a:xfrm>
           <a:prstGeom prst="rect">
             <a:avLst/>
@@ -19223,7 +19238,7 @@
                 </a:solidFill>
                 <a:latin typeface="+mj-lt"/>
               </a:rPr>
-              <a:t>Results</a:t>
+              <a:t>MFA</a:t>
             </a:r>
           </a:p>
           <a:p>
@@ -19243,8 +19258,36 @@
                 </a:solidFill>
                 <a:latin typeface="+mj-lt"/>
               </a:rPr>
-              <a:t>Conclusion</a:t>
-            </a:r>
+              <a:t>MFA – LCA coupling</a:t>
+            </a:r>
+          </a:p>
+          <a:p>
+            <a:pPr marL="342900" indent="-342900">
+              <a:lnSpc>
+                <a:spcPct val="150000"/>
+              </a:lnSpc>
+              <a:buFont typeface="+mj-lt"/>
+              <a:buAutoNum type="arabicPeriod"/>
+            </a:pPr>
+            <a:r>
+              <a:rPr lang="en-US" sz="2800" dirty="0">
+                <a:solidFill>
+                  <a:schemeClr val="bg2">
+                    <a:lumMod val="25000"/>
+                  </a:schemeClr>
+                </a:solidFill>
+                <a:latin typeface="+mj-lt"/>
+              </a:rPr>
+              <a:t>LCA results</a:t>
+            </a:r>
+            <a:endParaRPr lang="en-US" sz="2800" noProof="0" dirty="0">
+              <a:solidFill>
+                <a:schemeClr val="bg2">
+                  <a:lumMod val="25000"/>
+                </a:schemeClr>
+              </a:solidFill>
+              <a:latin typeface="+mj-lt"/>
+            </a:endParaRPr>
           </a:p>
         </p:txBody>
       </p:sp>

</xml_diff>